<commit_message>
Split delayed retest into two sessions.
</commit_message>
<xml_diff>
--- a/instructions/instructions_standard/Instructions.pptx
+++ b/instructions/instructions_standard/Instructions.pptx
@@ -16,6 +16,7 @@
     <p:sldId id="279" r:id="rId10"/>
     <p:sldId id="280" r:id="rId11"/>
     <p:sldId id="281" r:id="rId12"/>
+    <p:sldId id="282" r:id="rId13"/>
   </p:sldIdLst>
   <p:sldSz cx="18288000" cy="11430000"/>
   <p:notesSz cx="6858000" cy="9144000"/>
@@ -114,6 +115,11 @@
       </a:defRPr>
     </a:lvl9pPr>
   </p:defaultTextStyle>
+  <p:extLst>
+    <p:ext uri="{EFAFB233-063F-42B5-8137-9DF3F51BA10A}">
+      <p15:sldGuideLst xmlns:p15="http://schemas.microsoft.com/office/powerpoint/2012/main"/>
+    </p:ext>
+  </p:extLst>
 </p:presentation>
 </file>
 
@@ -248,7 +254,7 @@
           <a:p>
             <a:fld id="{3D371496-CA34-4B73-AFA2-A4B44C13D385}" type="datetimeFigureOut">
               <a:rPr lang="en-GB" smtClean="0"/>
-              <a:t>20/06/2019</a:t>
+              <a:t>17/02/2020</a:t>
             </a:fld>
             <a:endParaRPr lang="en-GB"/>
           </a:p>
@@ -418,7 +424,7 @@
           <a:p>
             <a:fld id="{3D371496-CA34-4B73-AFA2-A4B44C13D385}" type="datetimeFigureOut">
               <a:rPr lang="en-GB" smtClean="0"/>
-              <a:t>20/06/2019</a:t>
+              <a:t>17/02/2020</a:t>
             </a:fld>
             <a:endParaRPr lang="en-GB"/>
           </a:p>
@@ -598,7 +604,7 @@
           <a:p>
             <a:fld id="{3D371496-CA34-4B73-AFA2-A4B44C13D385}" type="datetimeFigureOut">
               <a:rPr lang="en-GB" smtClean="0"/>
-              <a:t>20/06/2019</a:t>
+              <a:t>17/02/2020</a:t>
             </a:fld>
             <a:endParaRPr lang="en-GB"/>
           </a:p>
@@ -768,7 +774,7 @@
           <a:p>
             <a:fld id="{3D371496-CA34-4B73-AFA2-A4B44C13D385}" type="datetimeFigureOut">
               <a:rPr lang="en-GB" smtClean="0"/>
-              <a:t>20/06/2019</a:t>
+              <a:t>17/02/2020</a:t>
             </a:fld>
             <a:endParaRPr lang="en-GB"/>
           </a:p>
@@ -1014,7 +1020,7 @@
           <a:p>
             <a:fld id="{3D371496-CA34-4B73-AFA2-A4B44C13D385}" type="datetimeFigureOut">
               <a:rPr lang="en-GB" smtClean="0"/>
-              <a:t>20/06/2019</a:t>
+              <a:t>17/02/2020</a:t>
             </a:fld>
             <a:endParaRPr lang="en-GB"/>
           </a:p>
@@ -1246,7 +1252,7 @@
           <a:p>
             <a:fld id="{3D371496-CA34-4B73-AFA2-A4B44C13D385}" type="datetimeFigureOut">
               <a:rPr lang="en-GB" smtClean="0"/>
-              <a:t>20/06/2019</a:t>
+              <a:t>17/02/2020</a:t>
             </a:fld>
             <a:endParaRPr lang="en-GB"/>
           </a:p>
@@ -1613,7 +1619,7 @@
           <a:p>
             <a:fld id="{3D371496-CA34-4B73-AFA2-A4B44C13D385}" type="datetimeFigureOut">
               <a:rPr lang="en-GB" smtClean="0"/>
-              <a:t>20/06/2019</a:t>
+              <a:t>17/02/2020</a:t>
             </a:fld>
             <a:endParaRPr lang="en-GB"/>
           </a:p>
@@ -1731,7 +1737,7 @@
           <a:p>
             <a:fld id="{3D371496-CA34-4B73-AFA2-A4B44C13D385}" type="datetimeFigureOut">
               <a:rPr lang="en-GB" smtClean="0"/>
-              <a:t>20/06/2019</a:t>
+              <a:t>17/02/2020</a:t>
             </a:fld>
             <a:endParaRPr lang="en-GB"/>
           </a:p>
@@ -1826,7 +1832,7 @@
           <a:p>
             <a:fld id="{3D371496-CA34-4B73-AFA2-A4B44C13D385}" type="datetimeFigureOut">
               <a:rPr lang="en-GB" smtClean="0"/>
-              <a:t>20/06/2019</a:t>
+              <a:t>17/02/2020</a:t>
             </a:fld>
             <a:endParaRPr lang="en-GB"/>
           </a:p>
@@ -2103,7 +2109,7 @@
           <a:p>
             <a:fld id="{3D371496-CA34-4B73-AFA2-A4B44C13D385}" type="datetimeFigureOut">
               <a:rPr lang="en-GB" smtClean="0"/>
-              <a:t>20/06/2019</a:t>
+              <a:t>17/02/2020</a:t>
             </a:fld>
             <a:endParaRPr lang="en-GB"/>
           </a:p>
@@ -2360,7 +2366,7 @@
           <a:p>
             <a:fld id="{3D371496-CA34-4B73-AFA2-A4B44C13D385}" type="datetimeFigureOut">
               <a:rPr lang="en-GB" smtClean="0"/>
-              <a:t>20/06/2019</a:t>
+              <a:t>17/02/2020</a:t>
             </a:fld>
             <a:endParaRPr lang="en-GB"/>
           </a:p>
@@ -2573,7 +2579,7 @@
           <a:p>
             <a:fld id="{3D371496-CA34-4B73-AFA2-A4B44C13D385}" type="datetimeFigureOut">
               <a:rPr lang="en-GB" smtClean="0"/>
-              <a:t>20/06/2019</a:t>
+              <a:t>17/02/2020</a:t>
             </a:fld>
             <a:endParaRPr lang="en-GB"/>
           </a:p>
@@ -4032,6 +4038,521 @@
     <p:extLst>
       <p:ext uri="{BB962C8B-B14F-4D97-AF65-F5344CB8AC3E}">
         <p14:creationId xmlns:p14="http://schemas.microsoft.com/office/powerpoint/2010/main" val="3860187060"/>
+      </p:ext>
+    </p:extLst>
+  </p:cSld>
+  <p:clrMapOvr>
+    <a:masterClrMapping/>
+  </p:clrMapOvr>
+</p:sld>
+</file>
+
+<file path=ppt/slides/slide12.xml><?xml version="1.0" encoding="utf-8"?>
+<p:sld xmlns:a="http://schemas.openxmlformats.org/drawingml/2006/main" xmlns:r="http://schemas.openxmlformats.org/officeDocument/2006/relationships" xmlns:p="http://schemas.openxmlformats.org/presentationml/2006/main">
+  <p:cSld>
+    <p:bg>
+      <p:bgPr>
+        <a:solidFill>
+          <a:srgbClr val="C8C8C8"/>
+        </a:solidFill>
+        <a:effectLst/>
+      </p:bgPr>
+    </p:bg>
+    <p:spTree>
+      <p:nvGrpSpPr>
+        <p:cNvPr id="1" name=""/>
+        <p:cNvGrpSpPr/>
+        <p:nvPr/>
+      </p:nvGrpSpPr>
+      <p:grpSpPr>
+        <a:xfrm>
+          <a:off x="0" y="0"/>
+          <a:ext cx="0" cy="0"/>
+          <a:chOff x="0" y="0"/>
+          <a:chExt cx="0" cy="0"/>
+        </a:xfrm>
+      </p:grpSpPr>
+      <p:sp>
+        <p:nvSpPr>
+          <p:cNvPr id="9" name="TextBox 8">
+            <a:extLst>
+              <a:ext uri="{FF2B5EF4-FFF2-40B4-BE49-F238E27FC236}">
+                <a16:creationId xmlns:a16="http://schemas.microsoft.com/office/drawing/2014/main" id="{329A056A-0B12-45D3-9C27-2C895A50C012}"/>
+              </a:ext>
+            </a:extLst>
+          </p:cNvPr>
+          <p:cNvSpPr txBox="1"/>
+          <p:nvPr/>
+        </p:nvSpPr>
+        <p:spPr>
+          <a:xfrm>
+            <a:off x="1162338" y="1254601"/>
+            <a:ext cx="15045636" cy="8956298"/>
+          </a:xfrm>
+          <a:prstGeom prst="rect">
+            <a:avLst/>
+          </a:prstGeom>
+          <a:noFill/>
+        </p:spPr>
+        <p:txBody>
+          <a:bodyPr wrap="square" rtlCol="0">
+            <a:spAutoFit/>
+          </a:bodyPr>
+          <a:lstStyle/>
+          <a:p>
+            <a:r>
+              <a:rPr lang="en-GB" sz="3600" dirty="0">
+                <a:latin typeface="Arial" panose="020B0604020202020204" pitchFamily="34" charset="0"/>
+                <a:cs typeface="Arial" panose="020B0604020202020204" pitchFamily="34" charset="0"/>
+              </a:rPr>
+              <a:t>One location around the circle will be highlighted.</a:t>
+            </a:r>
+          </a:p>
+          <a:p>
+            <a:r>
+              <a:rPr lang="en-GB" sz="3600" dirty="0">
+                <a:latin typeface="Arial" panose="020B0604020202020204" pitchFamily="34" charset="0"/>
+                <a:cs typeface="Arial" panose="020B0604020202020204" pitchFamily="34" charset="0"/>
+              </a:rPr>
+              <a:t>When you remember the corresponding object, press the UP arrow. </a:t>
+            </a:r>
+            <a:br>
+              <a:rPr lang="en-GB" sz="3600" dirty="0">
+                <a:latin typeface="Arial" panose="020B0604020202020204" pitchFamily="34" charset="0"/>
+                <a:cs typeface="Arial" panose="020B0604020202020204" pitchFamily="34" charset="0"/>
+              </a:rPr>
+            </a:br>
+            <a:r>
+              <a:rPr lang="en-GB" sz="3600" dirty="0">
+                <a:latin typeface="Arial" panose="020B0604020202020204" pitchFamily="34" charset="0"/>
+                <a:cs typeface="Arial" panose="020B0604020202020204" pitchFamily="34" charset="0"/>
+              </a:rPr>
+              <a:t>If you have forgotten the object, press DOWN.</a:t>
+            </a:r>
+          </a:p>
+          <a:p>
+            <a:endParaRPr lang="en-GB" sz="3600" dirty="0">
+              <a:latin typeface="Arial" panose="020B0604020202020204" pitchFamily="34" charset="0"/>
+              <a:cs typeface="Arial" panose="020B0604020202020204" pitchFamily="34" charset="0"/>
+            </a:endParaRPr>
+          </a:p>
+          <a:p>
+            <a:endParaRPr lang="en-GB" sz="3600" dirty="0">
+              <a:latin typeface="Arial" panose="020B0604020202020204" pitchFamily="34" charset="0"/>
+              <a:cs typeface="Arial" panose="020B0604020202020204" pitchFamily="34" charset="0"/>
+            </a:endParaRPr>
+          </a:p>
+          <a:p>
+            <a:endParaRPr lang="en-GB" sz="3600" dirty="0">
+              <a:latin typeface="Arial" panose="020B0604020202020204" pitchFamily="34" charset="0"/>
+              <a:cs typeface="Arial" panose="020B0604020202020204" pitchFamily="34" charset="0"/>
+            </a:endParaRPr>
+          </a:p>
+          <a:p>
+            <a:endParaRPr lang="en-GB" sz="3600" dirty="0">
+              <a:latin typeface="Arial" panose="020B0604020202020204" pitchFamily="34" charset="0"/>
+              <a:cs typeface="Arial" panose="020B0604020202020204" pitchFamily="34" charset="0"/>
+            </a:endParaRPr>
+          </a:p>
+          <a:p>
+            <a:endParaRPr lang="en-GB" sz="3600" dirty="0">
+              <a:latin typeface="Arial" panose="020B0604020202020204" pitchFamily="34" charset="0"/>
+              <a:cs typeface="Arial" panose="020B0604020202020204" pitchFamily="34" charset="0"/>
+            </a:endParaRPr>
+          </a:p>
+          <a:p>
+            <a:r>
+              <a:rPr lang="en-GB" sz="3600" dirty="0">
+                <a:latin typeface="Arial" panose="020B0604020202020204" pitchFamily="34" charset="0"/>
+                <a:cs typeface="Arial" panose="020B0604020202020204" pitchFamily="34" charset="0"/>
+              </a:rPr>
+              <a:t>You will then be shown two possible descriptions of the object.</a:t>
+            </a:r>
+          </a:p>
+          <a:p>
+            <a:endParaRPr lang="en-GB" sz="3600" dirty="0">
+              <a:latin typeface="Arial" panose="020B0604020202020204" pitchFamily="34" charset="0"/>
+              <a:cs typeface="Arial" panose="020B0604020202020204" pitchFamily="34" charset="0"/>
+            </a:endParaRPr>
+          </a:p>
+          <a:p>
+            <a:r>
+              <a:rPr lang="en-GB" sz="3600" dirty="0">
+                <a:latin typeface="Arial" panose="020B0604020202020204" pitchFamily="34" charset="0"/>
+                <a:cs typeface="Arial" panose="020B0604020202020204" pitchFamily="34" charset="0"/>
+              </a:rPr>
+              <a:t>Choose the correct description by pressing LEFT or RIGHT.</a:t>
+            </a:r>
+          </a:p>
+          <a:p>
+            <a:r>
+              <a:rPr lang="en-GB" sz="3600" dirty="0">
+                <a:latin typeface="Arial" panose="020B0604020202020204" pitchFamily="34" charset="0"/>
+                <a:cs typeface="Arial" panose="020B0604020202020204" pitchFamily="34" charset="0"/>
+              </a:rPr>
+              <a:t>If you have forgotten, press DOWN.</a:t>
+            </a:r>
+          </a:p>
+          <a:p>
+            <a:endParaRPr lang="en-GB" sz="3600" dirty="0">
+              <a:latin typeface="Arial" panose="020B0604020202020204" pitchFamily="34" charset="0"/>
+              <a:cs typeface="Arial" panose="020B0604020202020204" pitchFamily="34" charset="0"/>
+            </a:endParaRPr>
+          </a:p>
+          <a:p>
+            <a:endParaRPr lang="en-GB" sz="3600" dirty="0">
+              <a:latin typeface="Arial" panose="020B0604020202020204" pitchFamily="34" charset="0"/>
+              <a:cs typeface="Arial" panose="020B0604020202020204" pitchFamily="34" charset="0"/>
+            </a:endParaRPr>
+          </a:p>
+          <a:p>
+            <a:endParaRPr lang="en-GB" sz="3600" dirty="0">
+              <a:latin typeface="Arial" panose="020B0604020202020204" pitchFamily="34" charset="0"/>
+              <a:cs typeface="Arial" panose="020B0604020202020204" pitchFamily="34" charset="0"/>
+            </a:endParaRPr>
+          </a:p>
+          <a:p>
+            <a:r>
+              <a:rPr lang="en-GB" sz="3600" dirty="0">
+                <a:latin typeface="Arial" panose="020B0604020202020204" pitchFamily="34" charset="0"/>
+                <a:cs typeface="Arial" panose="020B0604020202020204" pitchFamily="34" charset="0"/>
+              </a:rPr>
+              <a:t>Press any key to start. </a:t>
+            </a:r>
+          </a:p>
+        </p:txBody>
+      </p:sp>
+      <p:pic>
+        <p:nvPicPr>
+          <p:cNvPr id="35" name="Picture 34" descr="arrowKeys.png">
+            <a:extLst>
+              <a:ext uri="{FF2B5EF4-FFF2-40B4-BE49-F238E27FC236}">
+                <a16:creationId xmlns:a16="http://schemas.microsoft.com/office/drawing/2014/main" id="{3C659BEC-26D8-49BE-8E71-1B3A1BC8811A}"/>
+              </a:ext>
+            </a:extLst>
+          </p:cNvPr>
+          <p:cNvPicPr>
+            <a:picLocks noChangeAspect="1"/>
+          </p:cNvPicPr>
+          <p:nvPr/>
+        </p:nvPicPr>
+        <p:blipFill rotWithShape="1">
+          <a:blip r:embed="rId2">
+            <a:extLst>
+              <a:ext uri="{28A0092B-C50C-407E-A947-70E740481C1C}">
+                <a14:useLocalDpi xmlns:a14="http://schemas.microsoft.com/office/drawing/2010/main" val="0"/>
+              </a:ext>
+            </a:extLst>
+          </a:blip>
+          <a:srcRect t="50000"/>
+          <a:stretch/>
+        </p:blipFill>
+        <p:spPr>
+          <a:xfrm>
+            <a:off x="14434818" y="7675026"/>
+            <a:ext cx="2861740" cy="978336"/>
+          </a:xfrm>
+          <a:prstGeom prst="rect">
+            <a:avLst/>
+          </a:prstGeom>
+        </p:spPr>
+      </p:pic>
+      <p:grpSp>
+        <p:nvGrpSpPr>
+          <p:cNvPr id="60" name="Group 59">
+            <a:extLst>
+              <a:ext uri="{FF2B5EF4-FFF2-40B4-BE49-F238E27FC236}">
+                <a16:creationId xmlns:a16="http://schemas.microsoft.com/office/drawing/2014/main" id="{0B679ABA-3E71-4195-A1A5-1944C59E9C7D}"/>
+              </a:ext>
+            </a:extLst>
+          </p:cNvPr>
+          <p:cNvGrpSpPr/>
+          <p:nvPr/>
+        </p:nvGrpSpPr>
+        <p:grpSpPr>
+          <a:xfrm>
+            <a:off x="14039761" y="2585817"/>
+            <a:ext cx="3416274" cy="2030281"/>
+            <a:chOff x="6237716" y="1710253"/>
+            <a:chExt cx="1943591" cy="1155072"/>
+          </a:xfrm>
+        </p:grpSpPr>
+        <p:pic>
+          <p:nvPicPr>
+            <p:cNvPr id="57" name="Picture 56" descr="arrowKeys.png">
+              <a:extLst>
+                <a:ext uri="{FF2B5EF4-FFF2-40B4-BE49-F238E27FC236}">
+                  <a16:creationId xmlns:a16="http://schemas.microsoft.com/office/drawing/2014/main" id="{0E61BB42-4FFD-4C11-9277-8431371F0EEA}"/>
+                </a:ext>
+              </a:extLst>
+            </p:cNvPr>
+            <p:cNvPicPr>
+              <a:picLocks noChangeAspect="1"/>
+            </p:cNvPicPr>
+            <p:nvPr/>
+          </p:nvPicPr>
+          <p:blipFill rotWithShape="1">
+            <a:blip r:embed="rId2">
+              <a:extLst>
+                <a:ext uri="{28A0092B-C50C-407E-A947-70E740481C1C}">
+                  <a14:useLocalDpi xmlns:a14="http://schemas.microsoft.com/office/drawing/2010/main" val="0"/>
+                </a:ext>
+              </a:extLst>
+            </a:blip>
+            <a:srcRect l="35776" r="32491" b="-3148"/>
+            <a:stretch/>
+          </p:blipFill>
+          <p:spPr>
+            <a:xfrm>
+              <a:off x="7570871" y="1710253"/>
+              <a:ext cx="519706" cy="1155072"/>
+            </a:xfrm>
+            <a:prstGeom prst="rect">
+              <a:avLst/>
+            </a:prstGeom>
+          </p:spPr>
+        </p:pic>
+        <p:sp>
+          <p:nvSpPr>
+            <p:cNvPr id="58" name="TextBox 57">
+              <a:extLst>
+                <a:ext uri="{FF2B5EF4-FFF2-40B4-BE49-F238E27FC236}">
+                  <a16:creationId xmlns:a16="http://schemas.microsoft.com/office/drawing/2014/main" id="{5AA0D89F-A0DF-46D2-8CE2-360EDD4F44DA}"/>
+                </a:ext>
+              </a:extLst>
+            </p:cNvPr>
+            <p:cNvSpPr txBox="1"/>
+            <p:nvPr/>
+          </p:nvSpPr>
+          <p:spPr>
+            <a:xfrm>
+              <a:off x="6237716" y="1856546"/>
+              <a:ext cx="1591201" cy="297671"/>
+            </a:xfrm>
+            <a:prstGeom prst="rect">
+              <a:avLst/>
+            </a:prstGeom>
+            <a:noFill/>
+          </p:spPr>
+          <p:txBody>
+            <a:bodyPr wrap="square" rtlCol="0">
+              <a:spAutoFit/>
+            </a:bodyPr>
+            <a:lstStyle/>
+            <a:p>
+              <a:r>
+                <a:rPr lang="en-GB" sz="2800" dirty="0">
+                  <a:solidFill>
+                    <a:srgbClr val="0070C0"/>
+                  </a:solidFill>
+                  <a:latin typeface="Arial" panose="020B0604020202020204" pitchFamily="34" charset="0"/>
+                  <a:cs typeface="Arial" panose="020B0604020202020204" pitchFamily="34" charset="0"/>
+                </a:rPr>
+                <a:t>remembered</a:t>
+              </a:r>
+            </a:p>
+          </p:txBody>
+        </p:sp>
+        <p:sp>
+          <p:nvSpPr>
+            <p:cNvPr id="59" name="TextBox 58">
+              <a:extLst>
+                <a:ext uri="{FF2B5EF4-FFF2-40B4-BE49-F238E27FC236}">
+                  <a16:creationId xmlns:a16="http://schemas.microsoft.com/office/drawing/2014/main" id="{6693F437-995D-4EC3-AA03-AC20067F40F1}"/>
+                </a:ext>
+              </a:extLst>
+            </p:cNvPr>
+            <p:cNvSpPr txBox="1"/>
+            <p:nvPr/>
+          </p:nvSpPr>
+          <p:spPr>
+            <a:xfrm>
+              <a:off x="6621500" y="2383534"/>
+              <a:ext cx="1559807" cy="297671"/>
+            </a:xfrm>
+            <a:prstGeom prst="rect">
+              <a:avLst/>
+            </a:prstGeom>
+            <a:noFill/>
+          </p:spPr>
+          <p:txBody>
+            <a:bodyPr wrap="square" rtlCol="0">
+              <a:spAutoFit/>
+            </a:bodyPr>
+            <a:lstStyle/>
+            <a:p>
+              <a:r>
+                <a:rPr lang="en-GB" sz="2800" dirty="0">
+                  <a:solidFill>
+                    <a:srgbClr val="0070C0"/>
+                  </a:solidFill>
+                  <a:latin typeface="Arial" panose="020B0604020202020204" pitchFamily="34" charset="0"/>
+                  <a:cs typeface="Arial" panose="020B0604020202020204" pitchFamily="34" charset="0"/>
+                </a:rPr>
+                <a:t>forgotten</a:t>
+              </a:r>
+            </a:p>
+          </p:txBody>
+        </p:sp>
+      </p:grpSp>
+      <p:grpSp>
+        <p:nvGrpSpPr>
+          <p:cNvPr id="19" name="Group 18">
+            <a:extLst>
+              <a:ext uri="{FF2B5EF4-FFF2-40B4-BE49-F238E27FC236}">
+                <a16:creationId xmlns:a16="http://schemas.microsoft.com/office/drawing/2014/main" id="{13C2D4F5-04FF-4599-8FEA-882B0A3DF061}"/>
+              </a:ext>
+            </a:extLst>
+          </p:cNvPr>
+          <p:cNvGrpSpPr/>
+          <p:nvPr/>
+        </p:nvGrpSpPr>
+        <p:grpSpPr>
+          <a:xfrm>
+            <a:off x="13857090" y="8615825"/>
+            <a:ext cx="2741692" cy="1072228"/>
+            <a:chOff x="6654014" y="2255311"/>
+            <a:chExt cx="1559807" cy="610014"/>
+          </a:xfrm>
+        </p:grpSpPr>
+        <p:pic>
+          <p:nvPicPr>
+            <p:cNvPr id="20" name="Picture 19" descr="arrowKeys.png">
+              <a:extLst>
+                <a:ext uri="{FF2B5EF4-FFF2-40B4-BE49-F238E27FC236}">
+                  <a16:creationId xmlns:a16="http://schemas.microsoft.com/office/drawing/2014/main" id="{FE5745E8-E1DC-43A1-A28C-FB62E4488A4F}"/>
+                </a:ext>
+              </a:extLst>
+            </p:cNvPr>
+            <p:cNvPicPr>
+              <a:picLocks noChangeAspect="1"/>
+            </p:cNvPicPr>
+            <p:nvPr/>
+          </p:nvPicPr>
+          <p:blipFill rotWithShape="1">
+            <a:blip r:embed="rId2">
+              <a:extLst>
+                <a:ext uri="{28A0092B-C50C-407E-A947-70E740481C1C}">
+                  <a14:useLocalDpi xmlns:a14="http://schemas.microsoft.com/office/drawing/2010/main" val="0"/>
+                </a:ext>
+              </a:extLst>
+            </a:blip>
+            <a:srcRect l="35776" t="48674" r="32491" b="-3148"/>
+            <a:stretch/>
+          </p:blipFill>
+          <p:spPr>
+            <a:xfrm>
+              <a:off x="7570872" y="2255311"/>
+              <a:ext cx="519706" cy="610014"/>
+            </a:xfrm>
+            <a:prstGeom prst="rect">
+              <a:avLst/>
+            </a:prstGeom>
+          </p:spPr>
+        </p:pic>
+        <p:sp>
+          <p:nvSpPr>
+            <p:cNvPr id="22" name="TextBox 21">
+              <a:extLst>
+                <a:ext uri="{FF2B5EF4-FFF2-40B4-BE49-F238E27FC236}">
+                  <a16:creationId xmlns:a16="http://schemas.microsoft.com/office/drawing/2014/main" id="{DD7EF53D-CF15-4B8D-887F-255DE4BCCB31}"/>
+                </a:ext>
+              </a:extLst>
+            </p:cNvPr>
+            <p:cNvSpPr txBox="1"/>
+            <p:nvPr/>
+          </p:nvSpPr>
+          <p:spPr>
+            <a:xfrm>
+              <a:off x="6654014" y="2378115"/>
+              <a:ext cx="1559807" cy="297671"/>
+            </a:xfrm>
+            <a:prstGeom prst="rect">
+              <a:avLst/>
+            </a:prstGeom>
+            <a:noFill/>
+          </p:spPr>
+          <p:txBody>
+            <a:bodyPr wrap="square" rtlCol="0">
+              <a:spAutoFit/>
+            </a:bodyPr>
+            <a:lstStyle/>
+            <a:p>
+              <a:r>
+                <a:rPr lang="en-GB" sz="2800" dirty="0">
+                  <a:solidFill>
+                    <a:srgbClr val="0070C0"/>
+                  </a:solidFill>
+                  <a:latin typeface="Arial" panose="020B0604020202020204" pitchFamily="34" charset="0"/>
+                  <a:cs typeface="Arial" panose="020B0604020202020204" pitchFamily="34" charset="0"/>
+                </a:rPr>
+                <a:t>forgotten</a:t>
+              </a:r>
+            </a:p>
+          </p:txBody>
+        </p:sp>
+      </p:grpSp>
+      <p:sp>
+        <p:nvSpPr>
+          <p:cNvPr id="24" name="Rectangle 23">
+            <a:extLst>
+              <a:ext uri="{FF2B5EF4-FFF2-40B4-BE49-F238E27FC236}">
+                <a16:creationId xmlns:a16="http://schemas.microsoft.com/office/drawing/2014/main" id="{B1D93D63-B2F1-4C39-81B2-A060EC1C7285}"/>
+              </a:ext>
+            </a:extLst>
+          </p:cNvPr>
+          <p:cNvSpPr/>
+          <p:nvPr/>
+        </p:nvSpPr>
+        <p:spPr>
+          <a:xfrm>
+            <a:off x="15477496" y="7645631"/>
+            <a:ext cx="908084" cy="978336"/>
+          </a:xfrm>
+          <a:prstGeom prst="rect">
+            <a:avLst/>
+          </a:prstGeom>
+          <a:solidFill>
+            <a:srgbClr val="C8C8C8"/>
+          </a:solidFill>
+          <a:ln>
+            <a:noFill/>
+          </a:ln>
+        </p:spPr>
+        <p:style>
+          <a:lnRef idx="2">
+            <a:schemeClr val="accent1">
+              <a:shade val="50000"/>
+            </a:schemeClr>
+          </a:lnRef>
+          <a:fillRef idx="1">
+            <a:schemeClr val="accent1"/>
+          </a:fillRef>
+          <a:effectRef idx="0">
+            <a:schemeClr val="accent1"/>
+          </a:effectRef>
+          <a:fontRef idx="minor">
+            <a:schemeClr val="lt1"/>
+          </a:fontRef>
+        </p:style>
+        <p:txBody>
+          <a:bodyPr rot="0" spcFirstLastPara="0" vertOverflow="overflow" horzOverflow="overflow" vert="horz" wrap="square" lIns="182880" tIns="91440" rIns="182880" bIns="91440" numCol="1" spcCol="0" rtlCol="0" fromWordArt="0" anchor="ctr" anchorCtr="0" forceAA="0" compatLnSpc="1">
+            <a:prstTxWarp prst="textNoShape">
+              <a:avLst/>
+            </a:prstTxWarp>
+            <a:noAutofit/>
+          </a:bodyPr>
+          <a:lstStyle/>
+          <a:p>
+            <a:pPr algn="ctr"/>
+            <a:endParaRPr lang="en-GB" sz="7200" dirty="0"/>
+          </a:p>
+        </p:txBody>
+      </p:sp>
+    </p:spTree>
+    <p:extLst>
+      <p:ext uri="{BB962C8B-B14F-4D97-AF65-F5344CB8AC3E}">
+        <p14:creationId xmlns:p14="http://schemas.microsoft.com/office/powerpoint/2010/main" val="1343977814"/>
       </p:ext>
     </p:extLst>
   </p:cSld>

</xml_diff>